<commit_message>
Alfoa/initialize for codes (#902)
 initialize info at the begin of the step before an actual perturbation is performed.
</commit_message>
<xml_diff>
--- a/doc/workshop/codeCoupling/code_coupling.pptx
+++ b/doc/workshop/codeCoupling/code_coupling.pptx
@@ -5,10 +5,10 @@
     <p:sldMasterId id="2147483648" r:id="rId1"/>
   </p:sldMasterIdLst>
   <p:notesMasterIdLst>
-    <p:notesMasterId r:id="rId27"/>
+    <p:notesMasterId r:id="rId28"/>
   </p:notesMasterIdLst>
   <p:handoutMasterIdLst>
-    <p:handoutMasterId r:id="rId28"/>
+    <p:handoutMasterId r:id="rId29"/>
   </p:handoutMasterIdLst>
   <p:sldIdLst>
     <p:sldId id="272" r:id="rId2"/>
@@ -26,16 +26,17 @@
     <p:sldId id="343" r:id="rId14"/>
     <p:sldId id="346" r:id="rId15"/>
     <p:sldId id="347" r:id="rId16"/>
-    <p:sldId id="349" r:id="rId17"/>
-    <p:sldId id="352" r:id="rId18"/>
-    <p:sldId id="359" r:id="rId19"/>
-    <p:sldId id="334" r:id="rId20"/>
-    <p:sldId id="360" r:id="rId21"/>
-    <p:sldId id="361" r:id="rId22"/>
-    <p:sldId id="337" r:id="rId23"/>
-    <p:sldId id="344" r:id="rId24"/>
-    <p:sldId id="350" r:id="rId25"/>
-    <p:sldId id="351" r:id="rId26"/>
+    <p:sldId id="362" r:id="rId17"/>
+    <p:sldId id="349" r:id="rId18"/>
+    <p:sldId id="352" r:id="rId19"/>
+    <p:sldId id="359" r:id="rId20"/>
+    <p:sldId id="334" r:id="rId21"/>
+    <p:sldId id="360" r:id="rId22"/>
+    <p:sldId id="361" r:id="rId23"/>
+    <p:sldId id="337" r:id="rId24"/>
+    <p:sldId id="344" r:id="rId25"/>
+    <p:sldId id="350" r:id="rId26"/>
+    <p:sldId id="351" r:id="rId27"/>
   </p:sldIdLst>
   <p:sldSz cx="9144000" cy="6858000" type="screen4x3"/>
   <p:notesSz cx="7010400" cy="9296400"/>
@@ -900,29 +901,6 @@
           <a:bodyPr/>
           <a:lstStyle/>
           <a:p>
-            <a:pPr marL="0" marR="0" indent="0" algn="l" defTabSz="914400" rtl="0" eaLnBrk="0" fontAlgn="base" latinLnBrk="0" hangingPunct="0">
-              <a:lnSpc>
-                <a:spcPct val="100000"/>
-              </a:lnSpc>
-              <a:spcBef>
-                <a:spcPct val="30000"/>
-              </a:spcBef>
-              <a:spcAft>
-                <a:spcPct val="0"/>
-              </a:spcAft>
-              <a:buClrTx/>
-              <a:buSzTx/>
-              <a:buFontTx/>
-              <a:buNone/>
-              <a:tabLst/>
-              <a:defRPr/>
-            </a:pPr>
-            <a:r>
-              <a:rPr lang="en-US" dirty="0"/>
-              <a:t>It needs to modify the input file, accordingly with respect to the variables RAVEN is providing. </a:t>
-            </a:r>
-          </a:p>
-          <a:p>
             <a:endParaRPr lang="en-US" dirty="0"/>
           </a:p>
         </p:txBody>
@@ -954,7 +932,7 @@
     </p:spTree>
     <p:extLst>
       <p:ext uri="{BB962C8B-B14F-4D97-AF65-F5344CB8AC3E}">
-        <p14:creationId xmlns:p14="http://schemas.microsoft.com/office/powerpoint/2010/main" val="3518615232"/>
+        <p14:creationId xmlns:p14="http://schemas.microsoft.com/office/powerpoint/2010/main" val="2783713931"/>
       </p:ext>
     </p:extLst>
   </p:cSld>
@@ -1008,6 +986,114 @@
           <a:bodyPr/>
           <a:lstStyle/>
           <a:p>
+            <a:pPr marL="0" marR="0" indent="0" algn="l" defTabSz="914400" rtl="0" eaLnBrk="0" fontAlgn="base" latinLnBrk="0" hangingPunct="0">
+              <a:lnSpc>
+                <a:spcPct val="100000"/>
+              </a:lnSpc>
+              <a:spcBef>
+                <a:spcPct val="30000"/>
+              </a:spcBef>
+              <a:spcAft>
+                <a:spcPct val="0"/>
+              </a:spcAft>
+              <a:buClrTx/>
+              <a:buSzTx/>
+              <a:buFontTx/>
+              <a:buNone/>
+              <a:tabLst/>
+              <a:defRPr/>
+            </a:pPr>
+            <a:r>
+              <a:rPr lang="en-US" dirty="0"/>
+              <a:t>It needs to modify the input file, accordingly with respect to the variables RAVEN is providing. </a:t>
+            </a:r>
+          </a:p>
+          <a:p>
+            <a:endParaRPr lang="en-US" dirty="0"/>
+          </a:p>
+        </p:txBody>
+      </p:sp>
+      <p:sp>
+        <p:nvSpPr>
+          <p:cNvPr id="4" name="Slide Number Placeholder 3"/>
+          <p:cNvSpPr>
+            <a:spLocks noGrp="1"/>
+          </p:cNvSpPr>
+          <p:nvPr>
+            <p:ph type="sldNum" sz="quarter" idx="10"/>
+          </p:nvPr>
+        </p:nvSpPr>
+        <p:spPr/>
+        <p:txBody>
+          <a:bodyPr/>
+          <a:lstStyle/>
+          <a:p>
+            <a:fld id="{55ECFD52-9CA0-4306-99FC-201DA20A9336}" type="slidenum">
+              <a:rPr lang="en-US" smtClean="0"/>
+              <a:pPr/>
+              <a:t>17</a:t>
+            </a:fld>
+            <a:endParaRPr lang="en-US"/>
+          </a:p>
+        </p:txBody>
+      </p:sp>
+    </p:spTree>
+    <p:extLst>
+      <p:ext uri="{BB962C8B-B14F-4D97-AF65-F5344CB8AC3E}">
+        <p14:creationId xmlns:p14="http://schemas.microsoft.com/office/powerpoint/2010/main" val="3518615232"/>
+      </p:ext>
+    </p:extLst>
+  </p:cSld>
+  <p:clrMapOvr>
+    <a:masterClrMapping/>
+  </p:clrMapOvr>
+</p:notes>
+</file>
+
+<file path=ppt/notesSlides/notesSlide4.xml><?xml version="1.0" encoding="utf-8"?>
+<p:notes xmlns:a="http://schemas.openxmlformats.org/drawingml/2006/main" xmlns:r="http://schemas.openxmlformats.org/officeDocument/2006/relationships" xmlns:p="http://schemas.openxmlformats.org/presentationml/2006/main">
+  <p:cSld>
+    <p:spTree>
+      <p:nvGrpSpPr>
+        <p:cNvPr id="1" name=""/>
+        <p:cNvGrpSpPr/>
+        <p:nvPr/>
+      </p:nvGrpSpPr>
+      <p:grpSpPr>
+        <a:xfrm>
+          <a:off x="0" y="0"/>
+          <a:ext cx="0" cy="0"/>
+          <a:chOff x="0" y="0"/>
+          <a:chExt cx="0" cy="0"/>
+        </a:xfrm>
+      </p:grpSpPr>
+      <p:sp>
+        <p:nvSpPr>
+          <p:cNvPr id="2" name="Slide Image Placeholder 1"/>
+          <p:cNvSpPr>
+            <a:spLocks noGrp="1" noRot="1" noChangeAspect="1"/>
+          </p:cNvSpPr>
+          <p:nvPr>
+            <p:ph type="sldImg"/>
+          </p:nvPr>
+        </p:nvSpPr>
+        <p:spPr/>
+      </p:sp>
+      <p:sp>
+        <p:nvSpPr>
+          <p:cNvPr id="3" name="Notes Placeholder 2"/>
+          <p:cNvSpPr>
+            <a:spLocks noGrp="1"/>
+          </p:cNvSpPr>
+          <p:nvPr>
+            <p:ph type="body" idx="1"/>
+          </p:nvPr>
+        </p:nvSpPr>
+        <p:spPr/>
+        <p:txBody>
+          <a:bodyPr/>
+          <a:lstStyle/>
+          <a:p>
             <a:r>
               <a:rPr lang="en-US" sz="1200" i="1" kern="1200" dirty="0">
                 <a:solidFill>
@@ -1127,7 +1213,7 @@
             <a:fld id="{55ECFD52-9CA0-4306-99FC-201DA20A9336}" type="slidenum">
               <a:rPr lang="en-US" smtClean="0"/>
               <a:pPr/>
-              <a:t>17</a:t>
+              <a:t>18</a:t>
             </a:fld>
             <a:endParaRPr lang="en-US"/>
           </a:p>
@@ -38018,7 +38104,7 @@
         </p:nvSpPr>
         <p:spPr>
           <a:xfrm>
-            <a:off x="73024" y="4399575"/>
+            <a:off x="73024" y="4915623"/>
             <a:ext cx="7695638" cy="338554"/>
           </a:xfrm>
           <a:prstGeom prst="rect">
@@ -38212,7 +38298,7 @@
         </p:nvSpPr>
         <p:spPr>
           <a:xfrm>
-            <a:off x="73028" y="5307720"/>
+            <a:off x="73028" y="5823768"/>
             <a:ext cx="7695634" cy="338554"/>
           </a:xfrm>
           <a:prstGeom prst="rect">
@@ -38302,7 +38388,7 @@
         </p:nvSpPr>
         <p:spPr bwMode="auto">
           <a:xfrm>
-            <a:off x="7860112" y="5266403"/>
+            <a:off x="7860112" y="5782451"/>
             <a:ext cx="1192237" cy="353683"/>
           </a:xfrm>
           <a:prstGeom prst="rect">
@@ -38378,7 +38464,7 @@
         </p:nvSpPr>
         <p:spPr bwMode="auto">
           <a:xfrm>
-            <a:off x="7860112" y="4820453"/>
+            <a:off x="7860112" y="5336501"/>
             <a:ext cx="1192237" cy="353683"/>
           </a:xfrm>
           <a:prstGeom prst="rect">
@@ -38864,7 +38950,7 @@
         </p:nvSpPr>
         <p:spPr>
           <a:xfrm>
-            <a:off x="73027" y="4869110"/>
+            <a:off x="73027" y="5385158"/>
             <a:ext cx="7695635" cy="338554"/>
           </a:xfrm>
           <a:prstGeom prst="rect">
@@ -38954,7 +39040,7 @@
         </p:nvSpPr>
         <p:spPr bwMode="auto">
           <a:xfrm>
-            <a:off x="7860112" y="4373387"/>
+            <a:off x="7860112" y="4889435"/>
             <a:ext cx="1192237" cy="353683"/>
           </a:xfrm>
           <a:prstGeom prst="rect">
@@ -39109,7 +39195,7 @@
         </p:nvSpPr>
         <p:spPr>
           <a:xfrm>
-            <a:off x="73028" y="5798674"/>
+            <a:off x="73028" y="6314722"/>
             <a:ext cx="7695634" cy="338554"/>
           </a:xfrm>
           <a:prstGeom prst="rect">
@@ -39206,7 +39292,165 @@
         </p:nvSpPr>
         <p:spPr bwMode="auto">
           <a:xfrm>
-            <a:off x="7860112" y="5757357"/>
+            <a:off x="7860112" y="6273405"/>
+            <a:ext cx="1192237" cy="353683"/>
+          </a:xfrm>
+          <a:prstGeom prst="rect">
+            <a:avLst/>
+          </a:prstGeom>
+          <a:ln>
+            <a:headEnd type="none" w="med" len="med"/>
+            <a:tailEnd type="none" w="med" len="med"/>
+          </a:ln>
+        </p:spPr>
+        <p:style>
+          <a:lnRef idx="0">
+            <a:schemeClr val="accent4"/>
+          </a:lnRef>
+          <a:fillRef idx="3">
+            <a:schemeClr val="accent4"/>
+          </a:fillRef>
+          <a:effectRef idx="3">
+            <a:schemeClr val="accent4"/>
+          </a:effectRef>
+          <a:fontRef idx="minor">
+            <a:schemeClr val="lt1"/>
+          </a:fontRef>
+        </p:style>
+        <p:txBody>
+          <a:bodyPr vert="horz" wrap="square" lIns="91440" tIns="45720" rIns="91440" bIns="45720" numCol="1" rtlCol="0" anchor="t" anchorCtr="0" compatLnSpc="1">
+            <a:prstTxWarp prst="textNoShape">
+              <a:avLst/>
+            </a:prstTxWarp>
+          </a:bodyPr>
+          <a:lstStyle/>
+          <a:p>
+            <a:pPr marL="0" marR="0" indent="0" algn="ctr" defTabSz="914400" rtl="0" eaLnBrk="0" fontAlgn="base" latinLnBrk="0" hangingPunct="0">
+              <a:lnSpc>
+                <a:spcPct val="100000"/>
+              </a:lnSpc>
+              <a:spcBef>
+                <a:spcPct val="0"/>
+              </a:spcBef>
+              <a:spcAft>
+                <a:spcPct val="0"/>
+              </a:spcAft>
+              <a:buClrTx/>
+              <a:buSzTx/>
+              <a:buFontTx/>
+              <a:buNone/>
+              <a:tabLst/>
+            </a:pPr>
+            <a:r>
+              <a:rPr lang="en-US" sz="1600" dirty="0">
+                <a:latin typeface="+mj-lt"/>
+              </a:rPr>
+              <a:t>Optional</a:t>
+            </a:r>
+            <a:endParaRPr kumimoji="0" lang="en-US" sz="1600" b="0" i="0" u="none" strike="noStrike" cap="none" normalizeH="0" baseline="0" dirty="0">
+              <a:ln>
+                <a:noFill/>
+              </a:ln>
+              <a:solidFill>
+                <a:schemeClr val="tx1"/>
+              </a:solidFill>
+              <a:effectLst/>
+              <a:latin typeface="+mj-lt"/>
+            </a:endParaRPr>
+          </a:p>
+        </p:txBody>
+      </p:sp>
+      <p:sp>
+        <p:nvSpPr>
+          <p:cNvPr id="29" name="TextBox 28">
+            <a:extLst>
+              <a:ext uri="{FF2B5EF4-FFF2-40B4-BE49-F238E27FC236}">
+                <a16:creationId xmlns:a16="http://schemas.microsoft.com/office/drawing/2014/main" id="{88C968E8-0DA8-F745-BACC-87D568397444}"/>
+              </a:ext>
+            </a:extLst>
+          </p:cNvPr>
+          <p:cNvSpPr txBox="1"/>
+          <p:nvPr/>
+        </p:nvSpPr>
+        <p:spPr>
+          <a:xfrm>
+            <a:off x="80576" y="4443343"/>
+            <a:ext cx="7695638" cy="338554"/>
+          </a:xfrm>
+          <a:prstGeom prst="rect">
+            <a:avLst/>
+          </a:prstGeom>
+          <a:solidFill>
+            <a:schemeClr val="bg1">
+              <a:lumMod val="85000"/>
+            </a:schemeClr>
+          </a:solidFill>
+          <a:ln>
+            <a:noFill/>
+          </a:ln>
+        </p:spPr>
+        <p:txBody>
+          <a:bodyPr wrap="square" rtlCol="0">
+            <a:spAutoFit/>
+          </a:bodyPr>
+          <a:lstStyle/>
+          <a:p>
+            <a:r>
+              <a:rPr lang="en-US" sz="1600" dirty="0">
+                <a:solidFill>
+                  <a:srgbClr val="1A4DB2"/>
+                </a:solidFill>
+                <a:latin typeface="Courier"/>
+                <a:cs typeface="Courier"/>
+              </a:rPr>
+              <a:t> def </a:t>
+            </a:r>
+            <a:r>
+              <a:rPr lang="en-US" sz="1600" b="1" dirty="0">
+                <a:latin typeface="Courier"/>
+                <a:cs typeface="Courier"/>
+              </a:rPr>
+              <a:t>initialize</a:t>
+            </a:r>
+            <a:r>
+              <a:rPr lang="en-US" sz="1600" dirty="0">
+                <a:latin typeface="Courier"/>
+                <a:cs typeface="Courier"/>
+              </a:rPr>
+              <a:t>(</a:t>
+            </a:r>
+            <a:r>
+              <a:rPr lang="en-US" sz="1600" i="1" dirty="0">
+                <a:latin typeface="Courier"/>
+                <a:cs typeface="Courier"/>
+              </a:rPr>
+              <a:t>self,runInfo, oinputs</a:t>
+            </a:r>
+            <a:r>
+              <a:rPr lang="en-US" sz="1600" dirty="0">
+                <a:latin typeface="Courier"/>
+                <a:cs typeface="Courier"/>
+              </a:rPr>
+              <a:t>)</a:t>
+            </a:r>
+          </a:p>
+        </p:txBody>
+      </p:sp>
+      <p:sp>
+        <p:nvSpPr>
+          <p:cNvPr id="30" name="Rectangle 29">
+            <a:extLst>
+              <a:ext uri="{FF2B5EF4-FFF2-40B4-BE49-F238E27FC236}">
+                <a16:creationId xmlns:a16="http://schemas.microsoft.com/office/drawing/2014/main" id="{21B9E96D-BA64-8245-AAF2-6A571A526496}"/>
+              </a:ext>
+            </a:extLst>
+          </p:cNvPr>
+          <p:cNvSpPr/>
+          <p:nvPr/>
+        </p:nvSpPr>
+        <p:spPr bwMode="auto">
+          <a:xfrm>
+            <a:off x="7867664" y="4417155"/>
             <a:ext cx="1192237" cy="353683"/>
           </a:xfrm>
           <a:prstGeom prst="rect">
@@ -41136,6 +41380,775 @@
             <a:pPr algn="ctr"/>
             <a:r>
               <a:rPr lang="en-US" sz="2700" b="0" dirty="0"/>
+              <a:t>Coupling an Application with RAVEN: initialize</a:t>
+            </a:r>
+          </a:p>
+        </p:txBody>
+      </p:sp>
+      <p:sp>
+        <p:nvSpPr>
+          <p:cNvPr id="9" name="Content Placeholder 2"/>
+          <p:cNvSpPr txBox="1">
+            <a:spLocks/>
+          </p:cNvSpPr>
+          <p:nvPr/>
+        </p:nvSpPr>
+        <p:spPr bwMode="auto">
+          <a:xfrm>
+            <a:off x="414053" y="1491083"/>
+            <a:ext cx="8471390" cy="1340270"/>
+          </a:xfrm>
+          <a:prstGeom prst="rect">
+            <a:avLst/>
+          </a:prstGeom>
+          <a:noFill/>
+          <a:ln w="9525">
+            <a:noFill/>
+            <a:miter lim="800000"/>
+            <a:headEnd/>
+            <a:tailEnd/>
+          </a:ln>
+          <a:effectLst/>
+        </p:spPr>
+        <p:txBody>
+          <a:bodyPr vert="horz" wrap="square" lIns="0" tIns="0" rIns="0" bIns="0" numCol="1" anchor="t" anchorCtr="0" compatLnSpc="1">
+            <a:prstTxWarp prst="textNoShape">
+              <a:avLst/>
+            </a:prstTxWarp>
+          </a:bodyPr>
+          <a:lstStyle>
+            <a:lvl1pPr marL="230188" indent="-230188" algn="l" rtl="0" eaLnBrk="0" fontAlgn="base" hangingPunct="0">
+              <a:lnSpc>
+                <a:spcPct val="85000"/>
+              </a:lnSpc>
+              <a:spcBef>
+                <a:spcPct val="40000"/>
+              </a:spcBef>
+              <a:spcAft>
+                <a:spcPct val="0"/>
+              </a:spcAft>
+              <a:buClr>
+                <a:srgbClr val="FF6600"/>
+              </a:buClr>
+              <a:buChar char="•"/>
+              <a:defRPr sz="2000">
+                <a:solidFill>
+                  <a:schemeClr val="tx1"/>
+                </a:solidFill>
+                <a:latin typeface="+mn-lt"/>
+                <a:ea typeface="+mn-ea"/>
+                <a:cs typeface="+mn-cs"/>
+              </a:defRPr>
+            </a:lvl1pPr>
+            <a:lvl2pPr marL="684213" indent="-227013" algn="l" rtl="0" eaLnBrk="0" fontAlgn="base" hangingPunct="0">
+              <a:lnSpc>
+                <a:spcPct val="85000"/>
+              </a:lnSpc>
+              <a:spcBef>
+                <a:spcPct val="20000"/>
+              </a:spcBef>
+              <a:spcAft>
+                <a:spcPct val="0"/>
+              </a:spcAft>
+              <a:buClr>
+                <a:srgbClr val="FF6600"/>
+              </a:buClr>
+              <a:buFont typeface="Times New Roman" pitchFamily="18" charset="0"/>
+              <a:buChar char="–"/>
+              <a:defRPr sz="2000">
+                <a:solidFill>
+                  <a:schemeClr val="tx1"/>
+                </a:solidFill>
+                <a:latin typeface="+mn-lt"/>
+              </a:defRPr>
+            </a:lvl2pPr>
+            <a:lvl3pPr marL="1143000" indent="-228600" algn="l" rtl="0" eaLnBrk="0" fontAlgn="base" hangingPunct="0">
+              <a:lnSpc>
+                <a:spcPct val="85000"/>
+              </a:lnSpc>
+              <a:spcBef>
+                <a:spcPct val="20000"/>
+              </a:spcBef>
+              <a:spcAft>
+                <a:spcPct val="0"/>
+              </a:spcAft>
+              <a:buClr>
+                <a:srgbClr val="FF6600"/>
+              </a:buClr>
+              <a:buChar char="•"/>
+              <a:defRPr sz="2000">
+                <a:solidFill>
+                  <a:schemeClr val="tx1"/>
+                </a:solidFill>
+                <a:latin typeface="+mn-lt"/>
+              </a:defRPr>
+            </a:lvl3pPr>
+            <a:lvl4pPr marL="1600200" indent="-228600" algn="l" rtl="0" eaLnBrk="0" fontAlgn="base" hangingPunct="0">
+              <a:lnSpc>
+                <a:spcPct val="85000"/>
+              </a:lnSpc>
+              <a:spcBef>
+                <a:spcPct val="20000"/>
+              </a:spcBef>
+              <a:spcAft>
+                <a:spcPct val="0"/>
+              </a:spcAft>
+              <a:buClr>
+                <a:srgbClr val="FF6600"/>
+              </a:buClr>
+              <a:buFont typeface="Times New Roman" pitchFamily="18" charset="0"/>
+              <a:buChar char="–"/>
+              <a:defRPr sz="2000">
+                <a:solidFill>
+                  <a:schemeClr val="tx1"/>
+                </a:solidFill>
+                <a:latin typeface="+mn-lt"/>
+              </a:defRPr>
+            </a:lvl4pPr>
+            <a:lvl5pPr marL="2057400" indent="-228600" algn="l" rtl="0" eaLnBrk="0" fontAlgn="base" hangingPunct="0">
+              <a:lnSpc>
+                <a:spcPct val="85000"/>
+              </a:lnSpc>
+              <a:spcBef>
+                <a:spcPct val="20000"/>
+              </a:spcBef>
+              <a:spcAft>
+                <a:spcPct val="0"/>
+              </a:spcAft>
+              <a:buClr>
+                <a:srgbClr val="FF6600"/>
+              </a:buClr>
+              <a:buChar char="•"/>
+              <a:defRPr sz="2000">
+                <a:solidFill>
+                  <a:schemeClr val="tx1"/>
+                </a:solidFill>
+                <a:latin typeface="+mn-lt"/>
+              </a:defRPr>
+            </a:lvl5pPr>
+            <a:lvl6pPr marL="2514600" indent="-228600" algn="l" rtl="0" eaLnBrk="0" fontAlgn="base" hangingPunct="0">
+              <a:lnSpc>
+                <a:spcPct val="85000"/>
+              </a:lnSpc>
+              <a:spcBef>
+                <a:spcPct val="20000"/>
+              </a:spcBef>
+              <a:spcAft>
+                <a:spcPct val="0"/>
+              </a:spcAft>
+              <a:buClr>
+                <a:srgbClr val="FF6600"/>
+              </a:buClr>
+              <a:buChar char="•"/>
+              <a:defRPr sz="2000">
+                <a:solidFill>
+                  <a:schemeClr val="tx1"/>
+                </a:solidFill>
+                <a:latin typeface="+mn-lt"/>
+              </a:defRPr>
+            </a:lvl6pPr>
+            <a:lvl7pPr marL="2971800" indent="-228600" algn="l" rtl="0" eaLnBrk="0" fontAlgn="base" hangingPunct="0">
+              <a:lnSpc>
+                <a:spcPct val="85000"/>
+              </a:lnSpc>
+              <a:spcBef>
+                <a:spcPct val="20000"/>
+              </a:spcBef>
+              <a:spcAft>
+                <a:spcPct val="0"/>
+              </a:spcAft>
+              <a:buClr>
+                <a:srgbClr val="FF6600"/>
+              </a:buClr>
+              <a:buChar char="•"/>
+              <a:defRPr sz="2000">
+                <a:solidFill>
+                  <a:schemeClr val="tx1"/>
+                </a:solidFill>
+                <a:latin typeface="+mn-lt"/>
+              </a:defRPr>
+            </a:lvl7pPr>
+            <a:lvl8pPr marL="3429000" indent="-228600" algn="l" rtl="0" eaLnBrk="0" fontAlgn="base" hangingPunct="0">
+              <a:lnSpc>
+                <a:spcPct val="85000"/>
+              </a:lnSpc>
+              <a:spcBef>
+                <a:spcPct val="20000"/>
+              </a:spcBef>
+              <a:spcAft>
+                <a:spcPct val="0"/>
+              </a:spcAft>
+              <a:buClr>
+                <a:srgbClr val="FF6600"/>
+              </a:buClr>
+              <a:buChar char="•"/>
+              <a:defRPr sz="2000">
+                <a:solidFill>
+                  <a:schemeClr val="tx1"/>
+                </a:solidFill>
+                <a:latin typeface="+mn-lt"/>
+              </a:defRPr>
+            </a:lvl8pPr>
+            <a:lvl9pPr marL="3886200" indent="-228600" algn="l" rtl="0" eaLnBrk="0" fontAlgn="base" hangingPunct="0">
+              <a:lnSpc>
+                <a:spcPct val="85000"/>
+              </a:lnSpc>
+              <a:spcBef>
+                <a:spcPct val="20000"/>
+              </a:spcBef>
+              <a:spcAft>
+                <a:spcPct val="0"/>
+              </a:spcAft>
+              <a:buClr>
+                <a:srgbClr val="FF6600"/>
+              </a:buClr>
+              <a:buChar char="•"/>
+              <a:defRPr sz="2000">
+                <a:solidFill>
+                  <a:schemeClr val="tx1"/>
+                </a:solidFill>
+                <a:latin typeface="+mn-lt"/>
+              </a:defRPr>
+            </a:lvl9pPr>
+          </a:lstStyle>
+          <a:p>
+            <a:r>
+              <a:rPr lang="en-US" dirty="0"/>
+              <a:t>This method is called, if present, by RAVEN at the begin of each Step. It can be used, for example, to retrieve info from the input files before an actual perturbation (sampling) begins.</a:t>
+            </a:r>
+          </a:p>
+        </p:txBody>
+      </p:sp>
+      <p:sp>
+        <p:nvSpPr>
+          <p:cNvPr id="17" name="Slide Number Placeholder 3"/>
+          <p:cNvSpPr>
+            <a:spLocks noGrp="1"/>
+          </p:cNvSpPr>
+          <p:nvPr>
+            <p:ph type="sldNum" sz="quarter" idx="11"/>
+          </p:nvPr>
+        </p:nvSpPr>
+        <p:spPr>
+          <a:xfrm>
+            <a:off x="8715375" y="6553200"/>
+            <a:ext cx="260350" cy="122238"/>
+          </a:xfrm>
+        </p:spPr>
+        <p:txBody>
+          <a:bodyPr/>
+          <a:lstStyle/>
+          <a:p>
+            <a:fld id="{4B4332F1-BAE3-4172-AA6D-91F763B329EF}" type="slidenum">
+              <a:rPr lang="en-US" smtClean="0"/>
+              <a:pPr/>
+              <a:t>16</a:t>
+            </a:fld>
+            <a:endParaRPr lang="en-US"/>
+          </a:p>
+        </p:txBody>
+      </p:sp>
+      <p:sp>
+        <p:nvSpPr>
+          <p:cNvPr id="24" name="TextBox 23"/>
+          <p:cNvSpPr txBox="1"/>
+          <p:nvPr/>
+        </p:nvSpPr>
+        <p:spPr>
+          <a:xfrm>
+            <a:off x="414053" y="2692722"/>
+            <a:ext cx="6763003" cy="584775"/>
+          </a:xfrm>
+          <a:prstGeom prst="rect">
+            <a:avLst/>
+          </a:prstGeom>
+          <a:solidFill>
+            <a:schemeClr val="bg1">
+              <a:lumMod val="85000"/>
+            </a:schemeClr>
+          </a:solidFill>
+          <a:ln>
+            <a:noFill/>
+          </a:ln>
+        </p:spPr>
+        <p:txBody>
+          <a:bodyPr wrap="square" rtlCol="0">
+            <a:spAutoFit/>
+          </a:bodyPr>
+          <a:lstStyle/>
+          <a:p>
+            <a:r>
+              <a:rPr lang="en-US" sz="1600" dirty="0">
+                <a:solidFill>
+                  <a:srgbClr val="1A4DB2"/>
+                </a:solidFill>
+                <a:latin typeface="Courier"/>
+                <a:cs typeface="Courier"/>
+              </a:rPr>
+              <a:t>def </a:t>
+            </a:r>
+            <a:r>
+              <a:rPr lang="en-US" sz="1600" b="1" dirty="0">
+                <a:latin typeface="Courier"/>
+                <a:cs typeface="Courier"/>
+              </a:rPr>
+              <a:t>initialize</a:t>
+            </a:r>
+            <a:r>
+              <a:rPr lang="en-US" sz="1600" dirty="0">
+                <a:latin typeface="Courier"/>
+                <a:cs typeface="Courier"/>
+              </a:rPr>
+              <a:t>(</a:t>
+            </a:r>
+            <a:r>
+              <a:rPr lang="en-US" sz="1600" i="1" dirty="0">
+                <a:latin typeface="Courier"/>
+                <a:cs typeface="Courier"/>
+              </a:rPr>
+              <a:t>self,runInfo, oinputs</a:t>
+            </a:r>
+            <a:r>
+              <a:rPr lang="en-US" sz="1600" dirty="0">
+                <a:latin typeface="Courier"/>
+                <a:cs typeface="Courier"/>
+              </a:rPr>
+              <a:t>):</a:t>
+            </a:r>
+          </a:p>
+          <a:p>
+            <a:r>
+              <a:rPr lang="en-US" sz="1600" dirty="0">
+                <a:latin typeface="Courier"/>
+                <a:cs typeface="Courier"/>
+              </a:rPr>
+              <a:t>  (</a:t>
+            </a:r>
+            <a:r>
+              <a:rPr lang="mr-IN" sz="1600" dirty="0">
+                <a:latin typeface="Courier"/>
+                <a:cs typeface="Courier"/>
+              </a:rPr>
+              <a:t>…</a:t>
+            </a:r>
+            <a:r>
+              <a:rPr lang="en-US" sz="1600" dirty="0">
+                <a:latin typeface="Courier"/>
+                <a:cs typeface="Courier"/>
+              </a:rPr>
+              <a:t>)  </a:t>
+            </a:r>
+          </a:p>
+        </p:txBody>
+      </p:sp>
+      <p:sp>
+        <p:nvSpPr>
+          <p:cNvPr id="25" name="Rectangle 24"/>
+          <p:cNvSpPr/>
+          <p:nvPr/>
+        </p:nvSpPr>
+        <p:spPr bwMode="auto">
+          <a:xfrm>
+            <a:off x="7671805" y="2769273"/>
+            <a:ext cx="1387428" cy="353683"/>
+          </a:xfrm>
+          <a:prstGeom prst="rect">
+            <a:avLst/>
+          </a:prstGeom>
+          <a:ln>
+            <a:headEnd type="none" w="med" len="med"/>
+            <a:tailEnd type="none" w="med" len="med"/>
+          </a:ln>
+        </p:spPr>
+        <p:style>
+          <a:lnRef idx="0">
+            <a:schemeClr val="accent4"/>
+          </a:lnRef>
+          <a:fillRef idx="3">
+            <a:schemeClr val="accent4"/>
+          </a:fillRef>
+          <a:effectRef idx="3">
+            <a:schemeClr val="accent4"/>
+          </a:effectRef>
+          <a:fontRef idx="minor">
+            <a:schemeClr val="lt1"/>
+          </a:fontRef>
+        </p:style>
+        <p:txBody>
+          <a:bodyPr vert="horz" wrap="square" lIns="91440" tIns="45720" rIns="91440" bIns="45720" numCol="1" rtlCol="0" anchor="t" anchorCtr="0" compatLnSpc="1">
+            <a:prstTxWarp prst="textNoShape">
+              <a:avLst/>
+            </a:prstTxWarp>
+          </a:bodyPr>
+          <a:lstStyle/>
+          <a:p>
+            <a:pPr marL="0" marR="0" indent="0" algn="ctr" defTabSz="914400" rtl="0" eaLnBrk="0" fontAlgn="base" latinLnBrk="0" hangingPunct="0">
+              <a:lnSpc>
+                <a:spcPct val="100000"/>
+              </a:lnSpc>
+              <a:spcBef>
+                <a:spcPct val="0"/>
+              </a:spcBef>
+              <a:spcAft>
+                <a:spcPct val="0"/>
+              </a:spcAft>
+              <a:buClrTx/>
+              <a:buSzTx/>
+              <a:buFontTx/>
+              <a:buNone/>
+              <a:tabLst/>
+            </a:pPr>
+            <a:r>
+              <a:rPr lang="en-US" sz="1600" dirty="0">
+                <a:solidFill>
+                  <a:schemeClr val="bg1"/>
+                </a:solidFill>
+                <a:latin typeface="+mj-lt"/>
+              </a:rPr>
+              <a:t>Optional</a:t>
+            </a:r>
+            <a:endParaRPr kumimoji="0" lang="en-US" sz="1600" b="0" i="0" u="none" strike="noStrike" cap="none" normalizeH="0" baseline="0" dirty="0">
+              <a:ln>
+                <a:noFill/>
+              </a:ln>
+              <a:solidFill>
+                <a:schemeClr val="bg1"/>
+              </a:solidFill>
+              <a:effectLst/>
+              <a:latin typeface="+mj-lt"/>
+            </a:endParaRPr>
+          </a:p>
+        </p:txBody>
+      </p:sp>
+      <p:sp>
+        <p:nvSpPr>
+          <p:cNvPr id="26" name="Content Placeholder 2"/>
+          <p:cNvSpPr txBox="1">
+            <a:spLocks/>
+          </p:cNvSpPr>
+          <p:nvPr/>
+        </p:nvSpPr>
+        <p:spPr bwMode="auto">
+          <a:xfrm>
+            <a:off x="113587" y="3717075"/>
+            <a:ext cx="9072321" cy="3299683"/>
+          </a:xfrm>
+          <a:prstGeom prst="rect">
+            <a:avLst/>
+          </a:prstGeom>
+          <a:noFill/>
+          <a:ln w="9525">
+            <a:noFill/>
+            <a:miter lim="800000"/>
+            <a:headEnd/>
+            <a:tailEnd/>
+          </a:ln>
+          <a:effectLst/>
+        </p:spPr>
+        <p:txBody>
+          <a:bodyPr vert="horz" wrap="square" lIns="0" tIns="0" rIns="0" bIns="0" numCol="1" anchor="t" anchorCtr="0" compatLnSpc="1">
+            <a:prstTxWarp prst="textNoShape">
+              <a:avLst/>
+            </a:prstTxWarp>
+          </a:bodyPr>
+          <a:lstStyle>
+            <a:lvl1pPr marL="230188" indent="-230188" algn="l" rtl="0" eaLnBrk="0" fontAlgn="base" hangingPunct="0">
+              <a:lnSpc>
+                <a:spcPct val="85000"/>
+              </a:lnSpc>
+              <a:spcBef>
+                <a:spcPct val="40000"/>
+              </a:spcBef>
+              <a:spcAft>
+                <a:spcPct val="0"/>
+              </a:spcAft>
+              <a:buClr>
+                <a:srgbClr val="FF6600"/>
+              </a:buClr>
+              <a:buChar char="•"/>
+              <a:defRPr sz="2000">
+                <a:solidFill>
+                  <a:schemeClr val="tx1"/>
+                </a:solidFill>
+                <a:latin typeface="+mn-lt"/>
+                <a:ea typeface="+mn-ea"/>
+                <a:cs typeface="+mn-cs"/>
+              </a:defRPr>
+            </a:lvl1pPr>
+            <a:lvl2pPr marL="684213" indent="-227013" algn="l" rtl="0" eaLnBrk="0" fontAlgn="base" hangingPunct="0">
+              <a:lnSpc>
+                <a:spcPct val="85000"/>
+              </a:lnSpc>
+              <a:spcBef>
+                <a:spcPct val="20000"/>
+              </a:spcBef>
+              <a:spcAft>
+                <a:spcPct val="0"/>
+              </a:spcAft>
+              <a:buClr>
+                <a:srgbClr val="FF6600"/>
+              </a:buClr>
+              <a:buFont typeface="Times New Roman" pitchFamily="18" charset="0"/>
+              <a:buChar char="–"/>
+              <a:defRPr sz="2000">
+                <a:solidFill>
+                  <a:schemeClr val="tx1"/>
+                </a:solidFill>
+                <a:latin typeface="+mn-lt"/>
+              </a:defRPr>
+            </a:lvl2pPr>
+            <a:lvl3pPr marL="1143000" indent="-228600" algn="l" rtl="0" eaLnBrk="0" fontAlgn="base" hangingPunct="0">
+              <a:lnSpc>
+                <a:spcPct val="85000"/>
+              </a:lnSpc>
+              <a:spcBef>
+                <a:spcPct val="20000"/>
+              </a:spcBef>
+              <a:spcAft>
+                <a:spcPct val="0"/>
+              </a:spcAft>
+              <a:buClr>
+                <a:srgbClr val="FF6600"/>
+              </a:buClr>
+              <a:buChar char="•"/>
+              <a:defRPr sz="2000">
+                <a:solidFill>
+                  <a:schemeClr val="tx1"/>
+                </a:solidFill>
+                <a:latin typeface="+mn-lt"/>
+              </a:defRPr>
+            </a:lvl3pPr>
+            <a:lvl4pPr marL="1600200" indent="-228600" algn="l" rtl="0" eaLnBrk="0" fontAlgn="base" hangingPunct="0">
+              <a:lnSpc>
+                <a:spcPct val="85000"/>
+              </a:lnSpc>
+              <a:spcBef>
+                <a:spcPct val="20000"/>
+              </a:spcBef>
+              <a:spcAft>
+                <a:spcPct val="0"/>
+              </a:spcAft>
+              <a:buClr>
+                <a:srgbClr val="FF6600"/>
+              </a:buClr>
+              <a:buFont typeface="Times New Roman" pitchFamily="18" charset="0"/>
+              <a:buChar char="–"/>
+              <a:defRPr sz="2000">
+                <a:solidFill>
+                  <a:schemeClr val="tx1"/>
+                </a:solidFill>
+                <a:latin typeface="+mn-lt"/>
+              </a:defRPr>
+            </a:lvl4pPr>
+            <a:lvl5pPr marL="2057400" indent="-228600" algn="l" rtl="0" eaLnBrk="0" fontAlgn="base" hangingPunct="0">
+              <a:lnSpc>
+                <a:spcPct val="85000"/>
+              </a:lnSpc>
+              <a:spcBef>
+                <a:spcPct val="20000"/>
+              </a:spcBef>
+              <a:spcAft>
+                <a:spcPct val="0"/>
+              </a:spcAft>
+              <a:buClr>
+                <a:srgbClr val="FF6600"/>
+              </a:buClr>
+              <a:buChar char="•"/>
+              <a:defRPr sz="2000">
+                <a:solidFill>
+                  <a:schemeClr val="tx1"/>
+                </a:solidFill>
+                <a:latin typeface="+mn-lt"/>
+              </a:defRPr>
+            </a:lvl5pPr>
+            <a:lvl6pPr marL="2514600" indent="-228600" algn="l" rtl="0" eaLnBrk="0" fontAlgn="base" hangingPunct="0">
+              <a:lnSpc>
+                <a:spcPct val="85000"/>
+              </a:lnSpc>
+              <a:spcBef>
+                <a:spcPct val="20000"/>
+              </a:spcBef>
+              <a:spcAft>
+                <a:spcPct val="0"/>
+              </a:spcAft>
+              <a:buClr>
+                <a:srgbClr val="FF6600"/>
+              </a:buClr>
+              <a:buChar char="•"/>
+              <a:defRPr sz="2000">
+                <a:solidFill>
+                  <a:schemeClr val="tx1"/>
+                </a:solidFill>
+                <a:latin typeface="+mn-lt"/>
+              </a:defRPr>
+            </a:lvl6pPr>
+            <a:lvl7pPr marL="2971800" indent="-228600" algn="l" rtl="0" eaLnBrk="0" fontAlgn="base" hangingPunct="0">
+              <a:lnSpc>
+                <a:spcPct val="85000"/>
+              </a:lnSpc>
+              <a:spcBef>
+                <a:spcPct val="20000"/>
+              </a:spcBef>
+              <a:spcAft>
+                <a:spcPct val="0"/>
+              </a:spcAft>
+              <a:buClr>
+                <a:srgbClr val="FF6600"/>
+              </a:buClr>
+              <a:buChar char="•"/>
+              <a:defRPr sz="2000">
+                <a:solidFill>
+                  <a:schemeClr val="tx1"/>
+                </a:solidFill>
+                <a:latin typeface="+mn-lt"/>
+              </a:defRPr>
+            </a:lvl7pPr>
+            <a:lvl8pPr marL="3429000" indent="-228600" algn="l" rtl="0" eaLnBrk="0" fontAlgn="base" hangingPunct="0">
+              <a:lnSpc>
+                <a:spcPct val="85000"/>
+              </a:lnSpc>
+              <a:spcBef>
+                <a:spcPct val="20000"/>
+              </a:spcBef>
+              <a:spcAft>
+                <a:spcPct val="0"/>
+              </a:spcAft>
+              <a:buClr>
+                <a:srgbClr val="FF6600"/>
+              </a:buClr>
+              <a:buChar char="•"/>
+              <a:defRPr sz="2000">
+                <a:solidFill>
+                  <a:schemeClr val="tx1"/>
+                </a:solidFill>
+                <a:latin typeface="+mn-lt"/>
+              </a:defRPr>
+            </a:lvl8pPr>
+            <a:lvl9pPr marL="3886200" indent="-228600" algn="l" rtl="0" eaLnBrk="0" fontAlgn="base" hangingPunct="0">
+              <a:lnSpc>
+                <a:spcPct val="85000"/>
+              </a:lnSpc>
+              <a:spcBef>
+                <a:spcPct val="20000"/>
+              </a:spcBef>
+              <a:spcAft>
+                <a:spcPct val="0"/>
+              </a:spcAft>
+              <a:buClr>
+                <a:srgbClr val="FF6600"/>
+              </a:buClr>
+              <a:buChar char="•"/>
+              <a:defRPr sz="2000">
+                <a:solidFill>
+                  <a:schemeClr val="tx1"/>
+                </a:solidFill>
+                <a:latin typeface="+mn-lt"/>
+              </a:defRPr>
+            </a:lvl9pPr>
+          </a:lstStyle>
+          <a:p>
+            <a:r>
+              <a:rPr lang="en-US" dirty="0"/>
+              <a:t>Arguments:</a:t>
+            </a:r>
+          </a:p>
+          <a:p>
+            <a:pPr lvl="1"/>
+            <a:r>
+              <a:rPr lang="en-US" i="1" dirty="0"/>
+              <a:t>runInfo	   : dictionary of the info contained in the &lt;RunInfo&gt; XML block of the RAVEN input file</a:t>
+            </a:r>
+          </a:p>
+          <a:p>
+            <a:pPr lvl="1"/>
+            <a:r>
+              <a:rPr lang="en-US" i="1" dirty="0"/>
+              <a:t>oinputs	   : list of the Step origianl input files</a:t>
+            </a:r>
+          </a:p>
+          <a:p>
+            <a:pPr lvl="2"/>
+            <a:endParaRPr lang="en-US" i="1" dirty="0"/>
+          </a:p>
+          <a:p>
+            <a:pPr lvl="2"/>
+            <a:endParaRPr lang="en-US" i="1" dirty="0"/>
+          </a:p>
+          <a:p>
+            <a:pPr lvl="1"/>
+            <a:endParaRPr lang="en-US" dirty="0"/>
+          </a:p>
+          <a:p>
+            <a:pPr lvl="1"/>
+            <a:endParaRPr lang="en-US" dirty="0"/>
+          </a:p>
+        </p:txBody>
+      </p:sp>
+    </p:spTree>
+    <p:extLst>
+      <p:ext uri="{BB962C8B-B14F-4D97-AF65-F5344CB8AC3E}">
+        <p14:creationId xmlns:p14="http://schemas.microsoft.com/office/powerpoint/2010/main" val="1710598495"/>
+      </p:ext>
+    </p:extLst>
+  </p:cSld>
+  <p:clrMapOvr>
+    <a:masterClrMapping/>
+  </p:clrMapOvr>
+  <mc:AlternateContent xmlns:mc="http://schemas.openxmlformats.org/markup-compatibility/2006" xmlns:p14="http://schemas.microsoft.com/office/powerpoint/2010/main">
+    <mc:Choice Requires="p14">
+      <p:transition spd="med" p14:dur="700">
+        <p:fade/>
+      </p:transition>
+    </mc:Choice>
+    <mc:Fallback xmlns="">
+      <p:transition xmlns:p14="http://schemas.microsoft.com/office/powerpoint/2010/main" spd="med">
+        <p:fade/>
+      </p:transition>
+    </mc:Fallback>
+  </mc:AlternateContent>
+</p:sld>
+</file>
+
+<file path=ppt/slides/slide17.xml><?xml version="1.0" encoding="utf-8"?>
+<p:sld xmlns:a="http://schemas.openxmlformats.org/drawingml/2006/main" xmlns:r="http://schemas.openxmlformats.org/officeDocument/2006/relationships" xmlns:p="http://schemas.openxmlformats.org/presentationml/2006/main">
+  <p:cSld>
+    <p:spTree>
+      <p:nvGrpSpPr>
+        <p:cNvPr id="1" name=""/>
+        <p:cNvGrpSpPr/>
+        <p:nvPr/>
+      </p:nvGrpSpPr>
+      <p:grpSpPr>
+        <a:xfrm>
+          <a:off x="0" y="0"/>
+          <a:ext cx="0" cy="0"/>
+          <a:chOff x="0" y="0"/>
+          <a:chExt cx="0" cy="0"/>
+        </a:xfrm>
+      </p:grpSpPr>
+      <p:sp>
+        <p:nvSpPr>
+          <p:cNvPr id="6" name="Title 1"/>
+          <p:cNvSpPr>
+            <a:spLocks noGrp="1"/>
+          </p:cNvSpPr>
+          <p:nvPr>
+            <p:ph type="title"/>
+          </p:nvPr>
+        </p:nvSpPr>
+        <p:spPr>
+          <a:xfrm>
+            <a:off x="124796" y="1004888"/>
+            <a:ext cx="8916432" cy="363561"/>
+          </a:xfrm>
+        </p:spPr>
+        <p:txBody>
+          <a:bodyPr/>
+          <a:lstStyle/>
+          <a:p>
+            <a:pPr algn="ctr"/>
+            <a:r>
+              <a:rPr lang="en-US" sz="2700" b="0" dirty="0"/>
               <a:t>Coupling an Application with RAVEN: </a:t>
             </a:r>
             <a:r>
@@ -41416,7 +42429,7 @@
             <a:fld id="{4B4332F1-BAE3-4172-AA6D-91F763B329EF}" type="slidenum">
               <a:rPr lang="en-US" smtClean="0"/>
               <a:pPr/>
-              <a:t>16</a:t>
+              <a:t>17</a:t>
             </a:fld>
             <a:endParaRPr lang="en-US"/>
           </a:p>
@@ -41952,7 +42965,7 @@
 </p:sld>
 </file>
 
-<file path=ppt/slides/slide17.xml><?xml version="1.0" encoding="utf-8"?>
+<file path=ppt/slides/slide18.xml><?xml version="1.0" encoding="utf-8"?>
 <p:sld xmlns:a="http://schemas.openxmlformats.org/drawingml/2006/main" xmlns:r="http://schemas.openxmlformats.org/officeDocument/2006/relationships" xmlns:p="http://schemas.openxmlformats.org/presentationml/2006/main">
   <p:cSld>
     <p:spTree>
@@ -42434,7 +43447,7 @@
             <a:fld id="{4B4332F1-BAE3-4172-AA6D-91F763B329EF}" type="slidenum">
               <a:rPr lang="en-US" smtClean="0"/>
               <a:pPr/>
-              <a:t>17</a:t>
+              <a:t>18</a:t>
             </a:fld>
             <a:endParaRPr lang="en-US"/>
           </a:p>
@@ -42862,7 +43875,7 @@
 </p:sld>
 </file>
 
-<file path=ppt/slides/slide18.xml><?xml version="1.0" encoding="utf-8"?>
+<file path=ppt/slides/slide19.xml><?xml version="1.0" encoding="utf-8"?>
 <p:sld xmlns:a="http://schemas.openxmlformats.org/drawingml/2006/main" xmlns:r="http://schemas.openxmlformats.org/officeDocument/2006/relationships" xmlns:p="http://schemas.openxmlformats.org/presentationml/2006/main">
   <p:cSld>
     <p:spTree>
@@ -42925,7 +43938,7 @@
             <a:fld id="{4B4332F1-BAE3-4172-AA6D-91F763B329EF}" type="slidenum">
               <a:rPr lang="en-US" smtClean="0"/>
               <a:pPr/>
-              <a:t>18</a:t>
+              <a:t>19</a:t>
             </a:fld>
             <a:endParaRPr lang="en-US"/>
           </a:p>
@@ -42956,7 +43969,229 @@
 </p:sld>
 </file>
 
-<file path=ppt/slides/slide19.xml><?xml version="1.0" encoding="utf-8"?>
+<file path=ppt/slides/slide2.xml><?xml version="1.0" encoding="utf-8"?>
+<p:sld xmlns:a="http://schemas.openxmlformats.org/drawingml/2006/main" xmlns:r="http://schemas.openxmlformats.org/officeDocument/2006/relationships" xmlns:p="http://schemas.openxmlformats.org/presentationml/2006/main">
+  <p:cSld>
+    <p:spTree>
+      <p:nvGrpSpPr>
+        <p:cNvPr id="1" name=""/>
+        <p:cNvGrpSpPr/>
+        <p:nvPr/>
+      </p:nvGrpSpPr>
+      <p:grpSpPr>
+        <a:xfrm>
+          <a:off x="0" y="0"/>
+          <a:ext cx="0" cy="0"/>
+          <a:chOff x="0" y="0"/>
+          <a:chExt cx="0" cy="0"/>
+        </a:xfrm>
+      </p:grpSpPr>
+      <p:sp>
+        <p:nvSpPr>
+          <p:cNvPr id="70658" name="Rectangle 2"/>
+          <p:cNvSpPr>
+            <a:spLocks noGrp="1" noChangeArrowheads="1"/>
+          </p:cNvSpPr>
+          <p:nvPr>
+            <p:ph type="title"/>
+          </p:nvPr>
+        </p:nvSpPr>
+        <p:spPr>
+          <a:xfrm>
+            <a:off x="455613" y="1004888"/>
+            <a:ext cx="8231187" cy="377026"/>
+          </a:xfrm>
+        </p:spPr>
+        <p:txBody>
+          <a:bodyPr/>
+          <a:lstStyle/>
+          <a:p>
+            <a:r>
+              <a:rPr lang="en-US" b="0" dirty="0"/>
+              <a:t>Outline </a:t>
+            </a:r>
+          </a:p>
+        </p:txBody>
+      </p:sp>
+      <p:sp>
+        <p:nvSpPr>
+          <p:cNvPr id="70659" name="Rectangle 3"/>
+          <p:cNvSpPr>
+            <a:spLocks noGrp="1" noChangeArrowheads="1"/>
+          </p:cNvSpPr>
+          <p:nvPr>
+            <p:ph type="body" idx="1"/>
+          </p:nvPr>
+        </p:nvSpPr>
+        <p:spPr>
+          <a:xfrm>
+            <a:off x="455613" y="1598613"/>
+            <a:ext cx="8231187" cy="4721685"/>
+          </a:xfrm>
+        </p:spPr>
+        <p:txBody>
+          <a:bodyPr/>
+          <a:lstStyle/>
+          <a:p>
+            <a:r>
+              <a:rPr lang="en-US" dirty="0">
+                <a:solidFill>
+                  <a:srgbClr val="3366FF"/>
+                </a:solidFill>
+              </a:rPr>
+              <a:t>Overview of RAVEN interaction with external Applications</a:t>
+            </a:r>
+          </a:p>
+          <a:p>
+            <a:pPr lvl="1"/>
+            <a:r>
+              <a:rPr lang="en-US" dirty="0"/>
+              <a:t>Available APIs: External Model and Code APIs</a:t>
+            </a:r>
+          </a:p>
+          <a:p>
+            <a:pPr marL="0" indent="0">
+              <a:buNone/>
+            </a:pPr>
+            <a:endParaRPr lang="en-US" dirty="0">
+              <a:solidFill>
+                <a:srgbClr val="3366FF"/>
+              </a:solidFill>
+            </a:endParaRPr>
+          </a:p>
+          <a:p>
+            <a:r>
+              <a:rPr lang="en-US" dirty="0">
+                <a:solidFill>
+                  <a:srgbClr val="3366FF"/>
+                </a:solidFill>
+              </a:rPr>
+              <a:t>Coupling a new Application through a Code Interface</a:t>
+            </a:r>
+          </a:p>
+          <a:p>
+            <a:pPr lvl="1"/>
+            <a:r>
+              <a:rPr lang="en-US" dirty="0"/>
+              <a:t>Introduction</a:t>
+            </a:r>
+          </a:p>
+          <a:p>
+            <a:pPr lvl="1"/>
+            <a:r>
+              <a:rPr lang="en-US" dirty="0"/>
+              <a:t>Code requirements</a:t>
+            </a:r>
+          </a:p>
+          <a:p>
+            <a:pPr lvl="1"/>
+            <a:r>
+              <a:rPr lang="en-US" dirty="0"/>
+              <a:t>Interfaces that need to be implemented</a:t>
+            </a:r>
+          </a:p>
+          <a:p>
+            <a:pPr lvl="1"/>
+            <a:r>
+              <a:rPr lang="en-US" dirty="0"/>
+              <a:t>Interaction with RAVEN</a:t>
+            </a:r>
+          </a:p>
+          <a:p>
+            <a:pPr marL="457200" lvl="1" indent="0">
+              <a:buNone/>
+            </a:pPr>
+            <a:endParaRPr lang="en-US" dirty="0"/>
+          </a:p>
+          <a:p>
+            <a:r>
+              <a:rPr lang="en-US" dirty="0">
+                <a:solidFill>
+                  <a:srgbClr val="3366FF"/>
+                </a:solidFill>
+              </a:rPr>
+              <a:t>Practical example of coupling a new code</a:t>
+            </a:r>
+          </a:p>
+          <a:p>
+            <a:pPr lvl="1"/>
+            <a:r>
+              <a:rPr lang="en-US" dirty="0"/>
+              <a:t>Code overview</a:t>
+            </a:r>
+          </a:p>
+          <a:p>
+            <a:pPr lvl="1"/>
+            <a:r>
+              <a:rPr lang="en-US" dirty="0"/>
+              <a:t>Creation of the input parser (coding)</a:t>
+            </a:r>
+          </a:p>
+          <a:p>
+            <a:pPr lvl="1"/>
+            <a:r>
+              <a:rPr lang="en-US" dirty="0"/>
+              <a:t>Creation of the output parser (coding)</a:t>
+            </a:r>
+          </a:p>
+          <a:p>
+            <a:pPr lvl="1"/>
+            <a:r>
+              <a:rPr lang="en-US" dirty="0"/>
+              <a:t>Execution of the interface (terminal)</a:t>
+            </a:r>
+          </a:p>
+          <a:p>
+            <a:pPr lvl="1"/>
+            <a:endParaRPr lang="en-US" dirty="0"/>
+          </a:p>
+        </p:txBody>
+      </p:sp>
+      <p:sp>
+        <p:nvSpPr>
+          <p:cNvPr id="2" name="Slide Number Placeholder 1"/>
+          <p:cNvSpPr>
+            <a:spLocks noGrp="1"/>
+          </p:cNvSpPr>
+          <p:nvPr>
+            <p:ph type="sldNum" sz="quarter" idx="11"/>
+          </p:nvPr>
+        </p:nvSpPr>
+        <p:spPr/>
+        <p:txBody>
+          <a:bodyPr/>
+          <a:lstStyle/>
+          <a:p>
+            <a:fld id="{4B4332F1-BAE3-4172-AA6D-91F763B329EF}" type="slidenum">
+              <a:rPr lang="en-US" smtClean="0"/>
+              <a:pPr/>
+              <a:t>2</a:t>
+            </a:fld>
+            <a:endParaRPr lang="en-US"/>
+          </a:p>
+        </p:txBody>
+      </p:sp>
+    </p:spTree>
+  </p:cSld>
+  <p:clrMapOvr>
+    <a:masterClrMapping/>
+  </p:clrMapOvr>
+  <mc:AlternateContent xmlns:mc="http://schemas.openxmlformats.org/markup-compatibility/2006" xmlns:p14="http://schemas.microsoft.com/office/powerpoint/2010/main">
+    <mc:Choice Requires="p14">
+      <p:transition spd="med" p14:dur="700">
+        <p:fade/>
+      </p:transition>
+    </mc:Choice>
+    <mc:Fallback xmlns="">
+      <p:transition xmlns:p14="http://schemas.microsoft.com/office/powerpoint/2010/main" spd="med">
+        <p:fade/>
+      </p:transition>
+    </mc:Fallback>
+  </mc:AlternateContent>
+</p:sld>
+</file>
+
+<file path=ppt/slides/slide20.xml><?xml version="1.0" encoding="utf-8"?>
 <p:sld xmlns:a="http://schemas.openxmlformats.org/drawingml/2006/main" xmlns:r="http://schemas.openxmlformats.org/officeDocument/2006/relationships" xmlns:p="http://schemas.openxmlformats.org/presentationml/2006/main">
   <p:cSld>
     <p:spTree>
@@ -43002,8 +44237,8 @@
           </a:p>
         </p:txBody>
       </p:sp>
-      <mc:AlternateContent xmlns:mc="http://schemas.openxmlformats.org/markup-compatibility/2006">
-        <mc:Choice xmlns:a14="http://schemas.microsoft.com/office/drawing/2010/main" Requires="a14">
+      <mc:AlternateContent xmlns:mc="http://schemas.openxmlformats.org/markup-compatibility/2006" xmlns:a14="http://schemas.microsoft.com/office/drawing/2010/main">
+        <mc:Choice Requires="a14">
           <p:sp>
             <p:nvSpPr>
               <p:cNvPr id="3" name="Content Placeholder 2">
@@ -43290,7 +44525,7 @@
             </p:txBody>
           </p:sp>
         </mc:Choice>
-        <mc:Fallback>
+        <mc:Fallback xmlns="">
           <p:sp>
             <p:nvSpPr>
               <p:cNvPr id="3" name="Content Placeholder 2">
@@ -43347,229 +44582,7 @@
 </p:sld>
 </file>
 
-<file path=ppt/slides/slide2.xml><?xml version="1.0" encoding="utf-8"?>
-<p:sld xmlns:a="http://schemas.openxmlformats.org/drawingml/2006/main" xmlns:r="http://schemas.openxmlformats.org/officeDocument/2006/relationships" xmlns:p="http://schemas.openxmlformats.org/presentationml/2006/main">
-  <p:cSld>
-    <p:spTree>
-      <p:nvGrpSpPr>
-        <p:cNvPr id="1" name=""/>
-        <p:cNvGrpSpPr/>
-        <p:nvPr/>
-      </p:nvGrpSpPr>
-      <p:grpSpPr>
-        <a:xfrm>
-          <a:off x="0" y="0"/>
-          <a:ext cx="0" cy="0"/>
-          <a:chOff x="0" y="0"/>
-          <a:chExt cx="0" cy="0"/>
-        </a:xfrm>
-      </p:grpSpPr>
-      <p:sp>
-        <p:nvSpPr>
-          <p:cNvPr id="70658" name="Rectangle 2"/>
-          <p:cNvSpPr>
-            <a:spLocks noGrp="1" noChangeArrowheads="1"/>
-          </p:cNvSpPr>
-          <p:nvPr>
-            <p:ph type="title"/>
-          </p:nvPr>
-        </p:nvSpPr>
-        <p:spPr>
-          <a:xfrm>
-            <a:off x="455613" y="1004888"/>
-            <a:ext cx="8231187" cy="377026"/>
-          </a:xfrm>
-        </p:spPr>
-        <p:txBody>
-          <a:bodyPr/>
-          <a:lstStyle/>
-          <a:p>
-            <a:r>
-              <a:rPr lang="en-US" b="0" dirty="0"/>
-              <a:t>Outline </a:t>
-            </a:r>
-          </a:p>
-        </p:txBody>
-      </p:sp>
-      <p:sp>
-        <p:nvSpPr>
-          <p:cNvPr id="70659" name="Rectangle 3"/>
-          <p:cNvSpPr>
-            <a:spLocks noGrp="1" noChangeArrowheads="1"/>
-          </p:cNvSpPr>
-          <p:nvPr>
-            <p:ph type="body" idx="1"/>
-          </p:nvPr>
-        </p:nvSpPr>
-        <p:spPr>
-          <a:xfrm>
-            <a:off x="455613" y="1598613"/>
-            <a:ext cx="8231187" cy="4721685"/>
-          </a:xfrm>
-        </p:spPr>
-        <p:txBody>
-          <a:bodyPr/>
-          <a:lstStyle/>
-          <a:p>
-            <a:r>
-              <a:rPr lang="en-US" dirty="0">
-                <a:solidFill>
-                  <a:srgbClr val="3366FF"/>
-                </a:solidFill>
-              </a:rPr>
-              <a:t>Overview of RAVEN interaction with external Applications</a:t>
-            </a:r>
-          </a:p>
-          <a:p>
-            <a:pPr lvl="1"/>
-            <a:r>
-              <a:rPr lang="en-US" dirty="0"/>
-              <a:t>Available APIs: External Model and Code APIs</a:t>
-            </a:r>
-          </a:p>
-          <a:p>
-            <a:pPr marL="0" indent="0">
-              <a:buNone/>
-            </a:pPr>
-            <a:endParaRPr lang="en-US" dirty="0">
-              <a:solidFill>
-                <a:srgbClr val="3366FF"/>
-              </a:solidFill>
-            </a:endParaRPr>
-          </a:p>
-          <a:p>
-            <a:r>
-              <a:rPr lang="en-US" dirty="0">
-                <a:solidFill>
-                  <a:srgbClr val="3366FF"/>
-                </a:solidFill>
-              </a:rPr>
-              <a:t>Coupling a new Application through a Code Interface</a:t>
-            </a:r>
-          </a:p>
-          <a:p>
-            <a:pPr lvl="1"/>
-            <a:r>
-              <a:rPr lang="en-US" dirty="0"/>
-              <a:t>Introduction</a:t>
-            </a:r>
-          </a:p>
-          <a:p>
-            <a:pPr lvl="1"/>
-            <a:r>
-              <a:rPr lang="en-US" dirty="0"/>
-              <a:t>Code requirements</a:t>
-            </a:r>
-          </a:p>
-          <a:p>
-            <a:pPr lvl="1"/>
-            <a:r>
-              <a:rPr lang="en-US" dirty="0"/>
-              <a:t>Interfaces that need to be implemented</a:t>
-            </a:r>
-          </a:p>
-          <a:p>
-            <a:pPr lvl="1"/>
-            <a:r>
-              <a:rPr lang="en-US" dirty="0"/>
-              <a:t>Interaction with RAVEN</a:t>
-            </a:r>
-          </a:p>
-          <a:p>
-            <a:pPr marL="457200" lvl="1" indent="0">
-              <a:buNone/>
-            </a:pPr>
-            <a:endParaRPr lang="en-US" dirty="0"/>
-          </a:p>
-          <a:p>
-            <a:r>
-              <a:rPr lang="en-US" dirty="0">
-                <a:solidFill>
-                  <a:srgbClr val="3366FF"/>
-                </a:solidFill>
-              </a:rPr>
-              <a:t>Practical example of coupling a new code</a:t>
-            </a:r>
-          </a:p>
-          <a:p>
-            <a:pPr lvl="1"/>
-            <a:r>
-              <a:rPr lang="en-US" dirty="0"/>
-              <a:t>Code overview</a:t>
-            </a:r>
-          </a:p>
-          <a:p>
-            <a:pPr lvl="1"/>
-            <a:r>
-              <a:rPr lang="en-US" dirty="0"/>
-              <a:t>Creation of the input parser (coding)</a:t>
-            </a:r>
-          </a:p>
-          <a:p>
-            <a:pPr lvl="1"/>
-            <a:r>
-              <a:rPr lang="en-US" dirty="0"/>
-              <a:t>Creation of the output parser (coding)</a:t>
-            </a:r>
-          </a:p>
-          <a:p>
-            <a:pPr lvl="1"/>
-            <a:r>
-              <a:rPr lang="en-US" dirty="0"/>
-              <a:t>Execution of the interface (terminal)</a:t>
-            </a:r>
-          </a:p>
-          <a:p>
-            <a:pPr lvl="1"/>
-            <a:endParaRPr lang="en-US" dirty="0"/>
-          </a:p>
-        </p:txBody>
-      </p:sp>
-      <p:sp>
-        <p:nvSpPr>
-          <p:cNvPr id="2" name="Slide Number Placeholder 1"/>
-          <p:cNvSpPr>
-            <a:spLocks noGrp="1"/>
-          </p:cNvSpPr>
-          <p:nvPr>
-            <p:ph type="sldNum" sz="quarter" idx="11"/>
-          </p:nvPr>
-        </p:nvSpPr>
-        <p:spPr/>
-        <p:txBody>
-          <a:bodyPr/>
-          <a:lstStyle/>
-          <a:p>
-            <a:fld id="{4B4332F1-BAE3-4172-AA6D-91F763B329EF}" type="slidenum">
-              <a:rPr lang="en-US" smtClean="0"/>
-              <a:pPr/>
-              <a:t>2</a:t>
-            </a:fld>
-            <a:endParaRPr lang="en-US"/>
-          </a:p>
-        </p:txBody>
-      </p:sp>
-    </p:spTree>
-  </p:cSld>
-  <p:clrMapOvr>
-    <a:masterClrMapping/>
-  </p:clrMapOvr>
-  <mc:AlternateContent xmlns:mc="http://schemas.openxmlformats.org/markup-compatibility/2006" xmlns:p14="http://schemas.microsoft.com/office/powerpoint/2010/main">
-    <mc:Choice Requires="p14">
-      <p:transition spd="med" p14:dur="700">
-        <p:fade/>
-      </p:transition>
-    </mc:Choice>
-    <mc:Fallback xmlns="">
-      <p:transition xmlns:p14="http://schemas.microsoft.com/office/powerpoint/2010/main" spd="med">
-        <p:fade/>
-      </p:transition>
-    </mc:Fallback>
-  </mc:AlternateContent>
-</p:sld>
-</file>
-
-<file path=ppt/slides/slide20.xml><?xml version="1.0" encoding="utf-8"?>
+<file path=ppt/slides/slide21.xml><?xml version="1.0" encoding="utf-8"?>
 <p:sld xmlns:a="http://schemas.openxmlformats.org/drawingml/2006/main" xmlns:r="http://schemas.openxmlformats.org/officeDocument/2006/relationships" xmlns:p="http://schemas.openxmlformats.org/presentationml/2006/main">
   <p:cSld>
     <p:spTree>
@@ -44047,7 +45060,7 @@
 </p:sld>
 </file>
 
-<file path=ppt/slides/slide21.xml><?xml version="1.0" encoding="utf-8"?>
+<file path=ppt/slides/slide22.xml><?xml version="1.0" encoding="utf-8"?>
 <p:sld xmlns:a="http://schemas.openxmlformats.org/drawingml/2006/main" xmlns:r="http://schemas.openxmlformats.org/officeDocument/2006/relationships" xmlns:p="http://schemas.openxmlformats.org/presentationml/2006/main">
   <p:cSld>
     <p:spTree>
@@ -46021,7 +47034,7 @@
 </p:sld>
 </file>
 
-<file path=ppt/slides/slide22.xml><?xml version="1.0" encoding="utf-8"?>
+<file path=ppt/slides/slide23.xml><?xml version="1.0" encoding="utf-8"?>
 <p:sld xmlns:a="http://schemas.openxmlformats.org/drawingml/2006/main" xmlns:r="http://schemas.openxmlformats.org/officeDocument/2006/relationships" xmlns:p="http://schemas.openxmlformats.org/presentationml/2006/main">
   <p:cSld>
     <p:spTree>
@@ -46246,7 +47259,7 @@
 </p:sld>
 </file>
 
-<file path=ppt/slides/slide23.xml><?xml version="1.0" encoding="utf-8"?>
+<file path=ppt/slides/slide24.xml><?xml version="1.0" encoding="utf-8"?>
 <p:sld xmlns:a="http://schemas.openxmlformats.org/drawingml/2006/main" xmlns:r="http://schemas.openxmlformats.org/officeDocument/2006/relationships" xmlns:p="http://schemas.openxmlformats.org/presentationml/2006/main">
   <p:cSld>
     <p:spTree>
@@ -46364,7 +47377,7 @@
 </p:sld>
 </file>
 
-<file path=ppt/slides/slide24.xml><?xml version="1.0" encoding="utf-8"?>
+<file path=ppt/slides/slide25.xml><?xml version="1.0" encoding="utf-8"?>
 <p:sld xmlns:a="http://schemas.openxmlformats.org/drawingml/2006/main" xmlns:r="http://schemas.openxmlformats.org/officeDocument/2006/relationships" xmlns:p="http://schemas.openxmlformats.org/presentationml/2006/main">
   <p:cSld>
     <p:spTree>
@@ -46449,7 +47462,7 @@
             <a:fld id="{4B4332F1-BAE3-4172-AA6D-91F763B329EF}" type="slidenum">
               <a:rPr lang="en-US" smtClean="0"/>
               <a:pPr/>
-              <a:t>24</a:t>
+              <a:t>25</a:t>
             </a:fld>
             <a:endParaRPr lang="en-US"/>
           </a:p>
@@ -46480,7 +47493,7 @@
 </p:sld>
 </file>
 
-<file path=ppt/slides/slide25.xml><?xml version="1.0" encoding="utf-8"?>
+<file path=ppt/slides/slide26.xml><?xml version="1.0" encoding="utf-8"?>
 <p:sld xmlns:a="http://schemas.openxmlformats.org/drawingml/2006/main" xmlns:r="http://schemas.openxmlformats.org/officeDocument/2006/relationships" xmlns:p="http://schemas.openxmlformats.org/presentationml/2006/main">
   <p:cSld>
     <p:spTree>
@@ -46515,7 +47528,7 @@
             <a:fld id="{4B4332F1-BAE3-4172-AA6D-91F763B329EF}" type="slidenum">
               <a:rPr lang="en-US" smtClean="0"/>
               <a:pPr/>
-              <a:t>25</a:t>
+              <a:t>26</a:t>
             </a:fld>
             <a:endParaRPr lang="en-US"/>
           </a:p>

</xml_diff>

<commit_message>
modified projectile for code coupling
</commit_message>
<xml_diff>
--- a/doc/workshop/codeCoupling/code_coupling.pptx
+++ b/doc/workshop/codeCoupling/code_coupling.pptx
@@ -38010,7 +38010,7 @@
         </p:nvSpPr>
         <p:spPr>
           <a:xfrm>
-            <a:off x="73026" y="3529174"/>
+            <a:off x="73026" y="3235252"/>
             <a:ext cx="7695636" cy="338554"/>
           </a:xfrm>
           <a:prstGeom prst="rect">
@@ -38104,7 +38104,7 @@
         </p:nvSpPr>
         <p:spPr>
           <a:xfrm>
-            <a:off x="73024" y="4915623"/>
+            <a:off x="73024" y="4589043"/>
             <a:ext cx="7695638" cy="338554"/>
           </a:xfrm>
           <a:prstGeom prst="rect">
@@ -38194,7 +38194,7 @@
         </p:nvSpPr>
         <p:spPr>
           <a:xfrm>
-            <a:off x="73026" y="3968523"/>
+            <a:off x="73026" y="3674601"/>
             <a:ext cx="7695636" cy="338554"/>
           </a:xfrm>
           <a:prstGeom prst="rect">
@@ -38298,7 +38298,7 @@
         </p:nvSpPr>
         <p:spPr>
           <a:xfrm>
-            <a:off x="73028" y="5823768"/>
+            <a:off x="73028" y="5497188"/>
             <a:ext cx="7695634" cy="338554"/>
           </a:xfrm>
           <a:prstGeom prst="rect">
@@ -38388,7 +38388,7 @@
         </p:nvSpPr>
         <p:spPr bwMode="auto">
           <a:xfrm>
-            <a:off x="7860112" y="5782451"/>
+            <a:off x="7860112" y="5455871"/>
             <a:ext cx="1192237" cy="353683"/>
           </a:xfrm>
           <a:prstGeom prst="rect">
@@ -38464,7 +38464,7 @@
         </p:nvSpPr>
         <p:spPr bwMode="auto">
           <a:xfrm>
-            <a:off x="7860112" y="5336501"/>
+            <a:off x="7860112" y="5009921"/>
             <a:ext cx="1192237" cy="353683"/>
           </a:xfrm>
           <a:prstGeom prst="rect">
@@ -38540,7 +38540,7 @@
         </p:nvSpPr>
         <p:spPr bwMode="auto">
           <a:xfrm>
-            <a:off x="7860112" y="3490832"/>
+            <a:off x="7860112" y="3196910"/>
             <a:ext cx="1192237" cy="353683"/>
           </a:xfrm>
           <a:prstGeom prst="rect">
@@ -38619,7 +38619,7 @@
         </p:nvSpPr>
         <p:spPr>
           <a:xfrm>
-            <a:off x="73026" y="3105100"/>
+            <a:off x="73026" y="2811178"/>
             <a:ext cx="7695636" cy="338554"/>
           </a:xfrm>
           <a:prstGeom prst="rect">
@@ -38950,7 +38950,7 @@
         </p:nvSpPr>
         <p:spPr>
           <a:xfrm>
-            <a:off x="73027" y="5385158"/>
+            <a:off x="73027" y="5058578"/>
             <a:ext cx="7695635" cy="338554"/>
           </a:xfrm>
           <a:prstGeom prst="rect">
@@ -39040,7 +39040,7 @@
         </p:nvSpPr>
         <p:spPr bwMode="auto">
           <a:xfrm>
-            <a:off x="7860112" y="4889435"/>
+            <a:off x="7860112" y="4562855"/>
             <a:ext cx="1192237" cy="353683"/>
           </a:xfrm>
           <a:prstGeom prst="rect">
@@ -39116,7 +39116,7 @@
         </p:nvSpPr>
         <p:spPr bwMode="auto">
           <a:xfrm>
-            <a:off x="7860112" y="3942335"/>
+            <a:off x="7860112" y="3648413"/>
             <a:ext cx="1192237" cy="353683"/>
           </a:xfrm>
           <a:prstGeom prst="rect">
@@ -39195,7 +39195,7 @@
         </p:nvSpPr>
         <p:spPr>
           <a:xfrm>
-            <a:off x="73028" y="6314722"/>
+            <a:off x="73028" y="5955484"/>
             <a:ext cx="7695634" cy="338554"/>
           </a:xfrm>
           <a:prstGeom prst="rect">
@@ -39292,7 +39292,7 @@
         </p:nvSpPr>
         <p:spPr bwMode="auto">
           <a:xfrm>
-            <a:off x="7860112" y="6273405"/>
+            <a:off x="7860112" y="5914167"/>
             <a:ext cx="1192237" cy="353683"/>
           </a:xfrm>
           <a:prstGeom prst="rect">
@@ -39374,7 +39374,7 @@
         </p:nvSpPr>
         <p:spPr>
           <a:xfrm>
-            <a:off x="80576" y="4443343"/>
+            <a:off x="80576" y="4149421"/>
             <a:ext cx="7695638" cy="338554"/>
           </a:xfrm>
           <a:prstGeom prst="rect">
@@ -39450,7 +39450,165 @@
         </p:nvSpPr>
         <p:spPr bwMode="auto">
           <a:xfrm>
-            <a:off x="7867664" y="4417155"/>
+            <a:off x="7867664" y="4123233"/>
+            <a:ext cx="1192237" cy="353683"/>
+          </a:xfrm>
+          <a:prstGeom prst="rect">
+            <a:avLst/>
+          </a:prstGeom>
+          <a:ln>
+            <a:headEnd type="none" w="med" len="med"/>
+            <a:tailEnd type="none" w="med" len="med"/>
+          </a:ln>
+        </p:spPr>
+        <p:style>
+          <a:lnRef idx="0">
+            <a:schemeClr val="accent4"/>
+          </a:lnRef>
+          <a:fillRef idx="3">
+            <a:schemeClr val="accent4"/>
+          </a:fillRef>
+          <a:effectRef idx="3">
+            <a:schemeClr val="accent4"/>
+          </a:effectRef>
+          <a:fontRef idx="minor">
+            <a:schemeClr val="lt1"/>
+          </a:fontRef>
+        </p:style>
+        <p:txBody>
+          <a:bodyPr vert="horz" wrap="square" lIns="91440" tIns="45720" rIns="91440" bIns="45720" numCol="1" rtlCol="0" anchor="t" anchorCtr="0" compatLnSpc="1">
+            <a:prstTxWarp prst="textNoShape">
+              <a:avLst/>
+            </a:prstTxWarp>
+          </a:bodyPr>
+          <a:lstStyle/>
+          <a:p>
+            <a:pPr marL="0" marR="0" indent="0" algn="ctr" defTabSz="914400" rtl="0" eaLnBrk="0" fontAlgn="base" latinLnBrk="0" hangingPunct="0">
+              <a:lnSpc>
+                <a:spcPct val="100000"/>
+              </a:lnSpc>
+              <a:spcBef>
+                <a:spcPct val="0"/>
+              </a:spcBef>
+              <a:spcAft>
+                <a:spcPct val="0"/>
+              </a:spcAft>
+              <a:buClrTx/>
+              <a:buSzTx/>
+              <a:buFontTx/>
+              <a:buNone/>
+              <a:tabLst/>
+            </a:pPr>
+            <a:r>
+              <a:rPr lang="en-US" sz="1600" dirty="0">
+                <a:latin typeface="+mj-lt"/>
+              </a:rPr>
+              <a:t>Optional</a:t>
+            </a:r>
+            <a:endParaRPr kumimoji="0" lang="en-US" sz="1600" b="0" i="0" u="none" strike="noStrike" cap="none" normalizeH="0" baseline="0" dirty="0">
+              <a:ln>
+                <a:noFill/>
+              </a:ln>
+              <a:solidFill>
+                <a:schemeClr val="tx1"/>
+              </a:solidFill>
+              <a:effectLst/>
+              <a:latin typeface="+mj-lt"/>
+            </a:endParaRPr>
+          </a:p>
+        </p:txBody>
+      </p:sp>
+      <p:sp>
+        <p:nvSpPr>
+          <p:cNvPr id="31" name="TextBox 30">
+            <a:extLst>
+              <a:ext uri="{FF2B5EF4-FFF2-40B4-BE49-F238E27FC236}">
+                <a16:creationId xmlns:a16="http://schemas.microsoft.com/office/drawing/2014/main" id="{F0C8E983-1EA6-A648-B2E9-B6B24937709D}"/>
+              </a:ext>
+            </a:extLst>
+          </p:cNvPr>
+          <p:cNvSpPr txBox="1"/>
+          <p:nvPr/>
+        </p:nvSpPr>
+        <p:spPr>
+          <a:xfrm>
+            <a:off x="73024" y="6366908"/>
+            <a:ext cx="7695634" cy="338554"/>
+          </a:xfrm>
+          <a:prstGeom prst="rect">
+            <a:avLst/>
+          </a:prstGeom>
+          <a:solidFill>
+            <a:schemeClr val="bg1">
+              <a:lumMod val="85000"/>
+            </a:schemeClr>
+          </a:solidFill>
+          <a:ln>
+            <a:noFill/>
+          </a:ln>
+        </p:spPr>
+        <p:txBody>
+          <a:bodyPr wrap="square" rtlCol="0">
+            <a:spAutoFit/>
+          </a:bodyPr>
+          <a:lstStyle/>
+          <a:p>
+            <a:r>
+              <a:rPr lang="en-US" sz="1600" dirty="0">
+                <a:solidFill>
+                  <a:srgbClr val="1A4DB2"/>
+                </a:solidFill>
+                <a:latin typeface="Courier"/>
+                <a:cs typeface="Courier"/>
+              </a:rPr>
+              <a:t> def </a:t>
+            </a:r>
+            <a:r>
+              <a:rPr lang="en-US" sz="1600" b="1" dirty="0" err="1">
+                <a:latin typeface="Courier"/>
+                <a:cs typeface="Courier"/>
+              </a:rPr>
+              <a:t>setRunOnShell</a:t>
+            </a:r>
+            <a:r>
+              <a:rPr lang="en-US" sz="1600" dirty="0">
+                <a:latin typeface="Courier"/>
+                <a:cs typeface="Courier"/>
+              </a:rPr>
+              <a:t>(</a:t>
+            </a:r>
+            <a:r>
+              <a:rPr lang="en-US" sz="1600" i="1" dirty="0">
+                <a:latin typeface="Courier"/>
+                <a:cs typeface="Courier"/>
+              </a:rPr>
+              <a:t>self, shell=True</a:t>
+            </a:r>
+            <a:r>
+              <a:rPr lang="en-US" sz="1600" dirty="0">
+                <a:latin typeface="Courier"/>
+                <a:cs typeface="Courier"/>
+              </a:rPr>
+              <a:t>)</a:t>
+            </a:r>
+          </a:p>
+        </p:txBody>
+      </p:sp>
+      <p:sp>
+        <p:nvSpPr>
+          <p:cNvPr id="32" name="Rectangle 31">
+            <a:extLst>
+              <a:ext uri="{FF2B5EF4-FFF2-40B4-BE49-F238E27FC236}">
+                <a16:creationId xmlns:a16="http://schemas.microsoft.com/office/drawing/2014/main" id="{24C64F47-9ED6-534C-B643-5F330FB78F6B}"/>
+              </a:ext>
+            </a:extLst>
+          </p:cNvPr>
+          <p:cNvSpPr/>
+          <p:nvPr/>
+        </p:nvSpPr>
+        <p:spPr bwMode="auto">
+          <a:xfrm>
+            <a:off x="7860108" y="6325591"/>
             <a:ext cx="1192237" cy="353683"/>
           </a:xfrm>
           <a:prstGeom prst="rect">
@@ -44863,7 +45021,7 @@
         <p:spPr>
           <a:xfrm>
             <a:off x="387169" y="5173156"/>
-            <a:ext cx="8494423" cy="1477328"/>
+            <a:ext cx="8494423" cy="1200329"/>
           </a:xfrm>
           <a:prstGeom prst="rect">
             <a:avLst/>
@@ -44913,37 +45071,8 @@
                 </a:solidFill>
                 <a:latin typeface="Lucida Console" panose="020B0609040504020204" pitchFamily="49" charset="0"/>
               </a:rPr>
-              <a:t>codeCoupling</a:t>
-            </a:r>
-            <a:r>
-              <a:rPr lang="en-US" sz="1800" dirty="0">
-                <a:solidFill>
-                  <a:schemeClr val="bg1"/>
-                </a:solidFill>
-                <a:latin typeface="Lucida Console" panose="020B0609040504020204" pitchFamily="49" charset="0"/>
-              </a:rPr>
-              <a:t>/</a:t>
-            </a:r>
-            <a:r>
-              <a:rPr lang="en-US" sz="1800" dirty="0" err="1">
-                <a:solidFill>
-                  <a:schemeClr val="bg1"/>
-                </a:solidFill>
-                <a:latin typeface="Lucida Console" panose="020B0609040504020204" pitchFamily="49" charset="0"/>
-              </a:rPr>
-              <a:t>projectile_model</a:t>
-            </a:r>
-            <a:endParaRPr lang="en-US" sz="1800" dirty="0">
-              <a:solidFill>
-                <a:schemeClr val="bg1"/>
-              </a:solidFill>
-              <a:latin typeface="Lucida Console" panose="020B0609040504020204" pitchFamily="49" charset="0"/>
-            </a:endParaRPr>
-          </a:p>
-          <a:p>
-            <a:pPr marL="0" indent="0">
-              <a:buNone/>
-            </a:pPr>
+              <a:t>ExternalModels</a:t>
+            </a:r>
             <a:endParaRPr lang="en-US" sz="1800" dirty="0">
               <a:latin typeface="Lucida Console" panose="020B0609040504020204" pitchFamily="49" charset="0"/>
             </a:endParaRPr>
@@ -45019,8 +45148,23 @@
                 </a:solidFill>
                 <a:latin typeface="Lucida Console" panose="020B0609040504020204" pitchFamily="49" charset="0"/>
               </a:rPr>
-              <a:t> –o out</a:t>
-            </a:r>
+              <a:t> -</a:t>
+            </a:r>
+            <a:r>
+              <a:rPr lang="en-US" sz="1800">
+                <a:solidFill>
+                  <a:schemeClr val="bg1"/>
+                </a:solidFill>
+                <a:latin typeface="Lucida Console" panose="020B0609040504020204" pitchFamily="49" charset="0"/>
+              </a:rPr>
+              <a:t>o out</a:t>
+            </a:r>
+            <a:endParaRPr lang="en-US" sz="1800" dirty="0">
+              <a:solidFill>
+                <a:schemeClr val="bg1"/>
+              </a:solidFill>
+              <a:latin typeface="Lucida Console" panose="020B0609040504020204" pitchFamily="49" charset="0"/>
+            </a:endParaRPr>
           </a:p>
           <a:p>
             <a:pPr marL="0" indent="0">
@@ -52325,8 +52469,8 @@
         </p:nvSpPr>
         <p:spPr bwMode="auto">
           <a:xfrm>
-            <a:off x="3130168" y="3087904"/>
-            <a:ext cx="2761957" cy="602445"/>
+            <a:off x="3108396" y="3000767"/>
+            <a:ext cx="2761957" cy="773587"/>
           </a:xfrm>
           <a:prstGeom prst="rect">
             <a:avLst/>

</xml_diff>

<commit_message>
finished code interface presentation
</commit_message>
<xml_diff>
--- a/doc/workshop/codeCoupling/code_coupling.pptx
+++ b/doc/workshop/codeCoupling/code_coupling.pptx
@@ -45148,23 +45148,8 @@
                 </a:solidFill>
                 <a:latin typeface="Lucida Console" panose="020B0609040504020204" pitchFamily="49" charset="0"/>
               </a:rPr>
-              <a:t> -</a:t>
-            </a:r>
-            <a:r>
-              <a:rPr lang="en-US" sz="1800">
-                <a:solidFill>
-                  <a:schemeClr val="bg1"/>
-                </a:solidFill>
-                <a:latin typeface="Lucida Console" panose="020B0609040504020204" pitchFamily="49" charset="0"/>
-              </a:rPr>
-              <a:t>o out</a:t>
-            </a:r>
-            <a:endParaRPr lang="en-US" sz="1800" dirty="0">
-              <a:solidFill>
-                <a:schemeClr val="bg1"/>
-              </a:solidFill>
-              <a:latin typeface="Lucida Console" panose="020B0609040504020204" pitchFamily="49" charset="0"/>
-            </a:endParaRPr>
+              <a:t> -o out -text</a:t>
+            </a:r>
           </a:p>
           <a:p>
             <a:pPr marL="0" indent="0">

</xml_diff>